<commit_message>
Create python notebook script to read temperature data series and perform baseline correction;
</commit_message>
<xml_diff>
--- a/day4 Group CA proposal (GC).pptx
+++ b/day4 Group CA proposal (GC).pptx
@@ -5,10 +5,10 @@
     <p:sldMasterId id="2147483693" r:id="rId1"/>
   </p:sldMasterIdLst>
   <p:notesMasterIdLst>
-    <p:notesMasterId r:id="rId9"/>
+    <p:notesMasterId r:id="rId10"/>
   </p:notesMasterIdLst>
   <p:handoutMasterIdLst>
-    <p:handoutMasterId r:id="rId10"/>
+    <p:handoutMasterId r:id="rId11"/>
   </p:handoutMasterIdLst>
   <p:sldIdLst>
     <p:sldId id="328" r:id="rId2"/>
@@ -16,13 +16,14 @@
     <p:sldId id="330" r:id="rId4"/>
     <p:sldId id="334" r:id="rId5"/>
     <p:sldId id="332" r:id="rId6"/>
-    <p:sldId id="331" r:id="rId7"/>
-    <p:sldId id="333" r:id="rId8"/>
+    <p:sldId id="335" r:id="rId7"/>
+    <p:sldId id="331" r:id="rId8"/>
+    <p:sldId id="333" r:id="rId9"/>
   </p:sldIdLst>
   <p:sldSz cx="9144000" cy="6858000" type="screen4x3"/>
   <p:notesSz cx="6797675" cy="9926638"/>
   <p:custDataLst>
-    <p:tags r:id="rId11"/>
+    <p:tags r:id="rId12"/>
   </p:custDataLst>
   <p:defaultTextStyle>
     <a:defPPr>
@@ -224,7 +225,7 @@
             <a:fld id="{43F1A4C9-FB5C-B247-A357-650712A3F0A8}" type="datetimeFigureOut">
               <a:rPr lang="en-US" smtClean="0"/>
               <a:pPr/>
-              <a:t>10/12/2019</a:t>
+              <a:t>10/14/2019</a:t>
             </a:fld>
             <a:endParaRPr lang="en-US"/>
           </a:p>
@@ -391,7 +392,7 @@
             <a:fld id="{EA4960E5-F060-4C88-B1C5-5A6F5890BEF6}" type="datetimeFigureOut">
               <a:rPr lang="en-SG" smtClean="0"/>
               <a:pPr/>
-              <a:t>12/10/2019</a:t>
+              <a:t>14/10/2019</a:t>
             </a:fld>
             <a:endParaRPr lang="en-SG"/>
           </a:p>
@@ -3540,11 +3541,7 @@
           <a:p>
             <a:r>
               <a:rPr lang="en-US" dirty="0" smtClean="0"/>
-              <a:t>Abnormal detection of </a:t>
-            </a:r>
-            <a:r>
-              <a:rPr lang="en-US" dirty="0" smtClean="0"/>
-              <a:t>Chip Temperature Time Series</a:t>
+              <a:t>Abnormal detection of Chip Temperature Time Series</a:t>
             </a:r>
             <a:endParaRPr lang="en-SG" dirty="0"/>
           </a:p>
@@ -3793,11 +3790,7 @@
           <a:p>
             <a:r>
               <a:rPr lang="en-US" dirty="0" smtClean="0"/>
-              <a:t>Business </a:t>
-            </a:r>
-            <a:r>
-              <a:rPr lang="en-US" dirty="0" smtClean="0"/>
-              <a:t>objective</a:t>
+              <a:t>Business objective</a:t>
             </a:r>
             <a:endParaRPr lang="en-SG" dirty="0"/>
           </a:p>
@@ -3843,11 +3836,7 @@
           <a:p>
             <a:r>
               <a:rPr lang="en-US" dirty="0" smtClean="0"/>
-              <a:t>Normal chips wi</a:t>
-            </a:r>
-            <a:r>
-              <a:rPr lang="en-US" dirty="0" smtClean="0"/>
-              <a:t>ll have a pattern of increasing temperature over time, due to the continuous heating of the oven, and faulty chips will have a different </a:t>
+              <a:t>Normal chips will have a pattern of increasing temperature over time, due to the continuous heating of the oven, and faulty chips will have a different </a:t>
             </a:r>
             <a:r>
               <a:rPr lang="en-US" dirty="0"/>
@@ -3954,11 +3943,7 @@
           <a:p>
             <a:r>
               <a:rPr lang="en-SG" dirty="0" smtClean="0"/>
-              <a:t>Technical </a:t>
-            </a:r>
-            <a:r>
-              <a:rPr lang="en-SG" dirty="0" smtClean="0"/>
-              <a:t>objective</a:t>
+              <a:t>Technical objective</a:t>
             </a:r>
             <a:endParaRPr lang="en-SG" dirty="0"/>
           </a:p>
@@ -4108,7 +4093,7 @@
         <p:spPr/>
         <p:txBody>
           <a:bodyPr>
-            <a:normAutofit lnSpcReduction="10000"/>
+            <a:normAutofit fontScale="92500" lnSpcReduction="10000"/>
           </a:bodyPr>
           <a:lstStyle/>
           <a:p>
@@ -4144,22 +4129,14 @@
             <a:pPr lvl="1"/>
             <a:r>
               <a:rPr lang="en-US" dirty="0" smtClean="0"/>
-              <a:t>Obtained during oven testing interval under </a:t>
-            </a:r>
+              <a:t>Obtained during oven testing interval under similar testing environment</a:t>
+            </a:r>
+          </a:p>
+          <a:p>
+            <a:pPr lvl="1"/>
             <a:r>
               <a:rPr lang="en-US" dirty="0" smtClean="0"/>
-              <a:t>similar testing environment</a:t>
-            </a:r>
-          </a:p>
-          <a:p>
-            <a:pPr lvl="1"/>
-            <a:r>
-              <a:rPr lang="en-US" dirty="0" smtClean="0"/>
-              <a:t>Contains 400 burn-in board</a:t>
-            </a:r>
-            <a:r>
-              <a:rPr lang="en-US" dirty="0" smtClean="0"/>
-              <a:t>, and each board contains 32 x 20 chips</a:t>
+              <a:t>Contains 400 burn-in board, and each board contains 32 x 20 chips</a:t>
             </a:r>
           </a:p>
           <a:p>
@@ -4171,9 +4148,16 @@
             <a:endParaRPr lang="en-SG" dirty="0" smtClean="0"/>
           </a:p>
           <a:p>
+            <a:endParaRPr lang="en-SG" dirty="0" smtClean="0"/>
+          </a:p>
+          <a:p>
             <a:r>
               <a:rPr lang="en-SG" dirty="0" smtClean="0"/>
-              <a:t>Reference code</a:t>
+              <a:t>Reference </a:t>
+            </a:r>
+            <a:r>
+              <a:rPr lang="en-SG" dirty="0" smtClean="0"/>
+              <a:t>code</a:t>
             </a:r>
             <a:endParaRPr lang="en-SG" dirty="0"/>
           </a:p>
@@ -4263,15 +4247,7 @@
           <a:p>
             <a:r>
               <a:rPr lang="en-US" dirty="0" smtClean="0"/>
-              <a:t>Proposed </a:t>
-            </a:r>
-            <a:r>
-              <a:rPr lang="en-US" dirty="0"/>
-              <a:t>A</a:t>
-            </a:r>
-            <a:r>
-              <a:rPr lang="en-US" dirty="0" smtClean="0"/>
-              <a:t>pproach</a:t>
+              <a:t>Resources</a:t>
             </a:r>
             <a:endParaRPr lang="en-SG" dirty="0"/>
           </a:p>
@@ -4289,69 +4265,18 @@
         </p:nvSpPr>
         <p:spPr/>
         <p:txBody>
-          <a:bodyPr/>
+          <a:bodyPr>
+            <a:normAutofit/>
+          </a:bodyPr>
           <a:lstStyle/>
           <a:p>
             <a:r>
-              <a:rPr lang="en-US" dirty="0" smtClean="0"/>
-              <a:t>Implement unsupervised anomaly detection </a:t>
-            </a:r>
-            <a:r>
-              <a:rPr lang="en-US" dirty="0"/>
-              <a:t>on </a:t>
-            </a:r>
-            <a:r>
-              <a:rPr lang="en-US" dirty="0" smtClean="0"/>
-              <a:t>temperature time series data </a:t>
-            </a:r>
-            <a:endParaRPr lang="en-US" dirty="0"/>
-          </a:p>
-          <a:p>
-            <a:pPr lvl="1"/>
-            <a:r>
-              <a:rPr lang="en-US" dirty="0" smtClean="0"/>
-              <a:t>Temperature time series </a:t>
-            </a:r>
-            <a:r>
-              <a:rPr lang="en-US" dirty="0"/>
-              <a:t>data will be generated by sensor</a:t>
-            </a:r>
-          </a:p>
-          <a:p>
-            <a:pPr lvl="1"/>
-            <a:r>
-              <a:rPr lang="en-US" dirty="0"/>
-              <a:t>Train an auto-encoder on the training temperature data </a:t>
-            </a:r>
-          </a:p>
-          <a:p>
-            <a:pPr lvl="1"/>
-            <a:r>
-              <a:rPr lang="en-US" dirty="0"/>
-              <a:t>Evaluate it on the validation temperature data and the reconstructed error </a:t>
-            </a:r>
-            <a:r>
-              <a:rPr lang="en-US" dirty="0" smtClean="0"/>
-              <a:t>plot</a:t>
-            </a:r>
-          </a:p>
-          <a:p>
-            <a:pPr lvl="1"/>
-            <a:r>
-              <a:rPr lang="en-US" dirty="0" smtClean="0"/>
-              <a:t>Choose the threshold and determine the value is abnormal or not</a:t>
-            </a:r>
-          </a:p>
-          <a:p>
-            <a:pPr lvl="1"/>
-            <a:r>
-              <a:rPr lang="en-US" dirty="0" smtClean="0"/>
-              <a:t>Label chip as faulty if abnormal value is detected</a:t>
-            </a:r>
-            <a:endParaRPr lang="en-US" dirty="0"/>
-          </a:p>
-          <a:p>
-            <a:endParaRPr lang="en-SG" dirty="0"/>
+              <a:rPr lang="en-SG" dirty="0" smtClean="0"/>
+              <a:t>Dataset</a:t>
+            </a:r>
+          </a:p>
+          <a:p>
+            <a:endParaRPr lang="en-SG" dirty="0" smtClean="0"/>
           </a:p>
         </p:txBody>
       </p:sp>
@@ -4383,10 +4308,33 @@
           </a:p>
         </p:txBody>
       </p:sp>
+      <p:pic>
+        <p:nvPicPr>
+          <p:cNvPr id="7" name="Picture 6"/>
+          <p:cNvPicPr>
+            <a:picLocks noChangeAspect="1"/>
+          </p:cNvPicPr>
+          <p:nvPr/>
+        </p:nvPicPr>
+        <p:blipFill rotWithShape="1">
+          <a:blip r:embed="rId2"/>
+          <a:srcRect t="3768"/>
+          <a:stretch/>
+        </p:blipFill>
+        <p:spPr>
+          <a:xfrm>
+            <a:off x="833716" y="1978864"/>
+            <a:ext cx="7378855" cy="2485560"/>
+          </a:xfrm>
+          <a:prstGeom prst="rect">
+            <a:avLst/>
+          </a:prstGeom>
+        </p:spPr>
+      </p:pic>
     </p:spTree>
     <p:extLst>
       <p:ext uri="{BB962C8B-B14F-4D97-AF65-F5344CB8AC3E}">
-        <p14:creationId xmlns:p14="http://schemas.microsoft.com/office/powerpoint/2010/main" val="2796628514"/>
+        <p14:creationId xmlns:p14="http://schemas.microsoft.com/office/powerpoint/2010/main" val="2276034300"/>
       </p:ext>
     </p:extLst>
   </p:cSld>
@@ -4432,31 +4380,100 @@
         </p:nvSpPr>
         <p:spPr/>
         <p:txBody>
+          <a:bodyPr>
+            <a:normAutofit/>
+          </a:bodyPr>
+          <a:lstStyle/>
+          <a:p>
+            <a:r>
+              <a:rPr lang="en-US" dirty="0" smtClean="0"/>
+              <a:t>Proposed </a:t>
+            </a:r>
+            <a:r>
+              <a:rPr lang="en-US" dirty="0"/>
+              <a:t>A</a:t>
+            </a:r>
+            <a:r>
+              <a:rPr lang="en-US" dirty="0" smtClean="0"/>
+              <a:t>pproach</a:t>
+            </a:r>
+            <a:endParaRPr lang="en-SG" dirty="0"/>
+          </a:p>
+        </p:txBody>
+      </p:sp>
+      <p:sp>
+        <p:nvSpPr>
+          <p:cNvPr id="3" name="Text Placeholder 2"/>
+          <p:cNvSpPr>
+            <a:spLocks noGrp="1"/>
+          </p:cNvSpPr>
+          <p:nvPr>
+            <p:ph type="body" sz="quarter" idx="13"/>
+          </p:nvPr>
+        </p:nvSpPr>
+        <p:spPr/>
+        <p:txBody>
           <a:bodyPr/>
           <a:lstStyle/>
           <a:p>
             <a:r>
               <a:rPr lang="en-US" dirty="0" smtClean="0"/>
-              <a:t>Any other additional comment</a:t>
-            </a:r>
-            <a:endParaRPr lang="en-SG" dirty="0"/>
-          </a:p>
-        </p:txBody>
-      </p:sp>
-      <p:sp>
-        <p:nvSpPr>
-          <p:cNvPr id="3" name="Text Placeholder 2"/>
-          <p:cNvSpPr>
-            <a:spLocks noGrp="1"/>
-          </p:cNvSpPr>
-          <p:nvPr>
-            <p:ph type="body" sz="quarter" idx="13"/>
-          </p:nvPr>
-        </p:nvSpPr>
-        <p:spPr/>
-        <p:txBody>
-          <a:bodyPr/>
-          <a:lstStyle/>
+              <a:t>Implement unsupervised anomaly detection </a:t>
+            </a:r>
+            <a:r>
+              <a:rPr lang="en-US" dirty="0"/>
+              <a:t>on </a:t>
+            </a:r>
+            <a:r>
+              <a:rPr lang="en-US" dirty="0" smtClean="0"/>
+              <a:t>temperature time series data </a:t>
+            </a:r>
+            <a:endParaRPr lang="en-US" dirty="0"/>
+          </a:p>
+          <a:p>
+            <a:pPr lvl="1"/>
+            <a:r>
+              <a:rPr lang="en-US" dirty="0" smtClean="0"/>
+              <a:t>Temperature time series </a:t>
+            </a:r>
+            <a:r>
+              <a:rPr lang="en-US" dirty="0"/>
+              <a:t>data will be generated by sensor</a:t>
+            </a:r>
+          </a:p>
+          <a:p>
+            <a:pPr lvl="1"/>
+            <a:r>
+              <a:rPr lang="en-US" dirty="0"/>
+              <a:t>Train an auto-encoder on the training temperature data </a:t>
+            </a:r>
+          </a:p>
+          <a:p>
+            <a:pPr lvl="1"/>
+            <a:r>
+              <a:rPr lang="en-US" dirty="0"/>
+              <a:t>Evaluate it on the validation temperature data and the reconstructed error </a:t>
+            </a:r>
+            <a:r>
+              <a:rPr lang="en-US" dirty="0" smtClean="0"/>
+              <a:t>plot</a:t>
+            </a:r>
+          </a:p>
+          <a:p>
+            <a:pPr lvl="1"/>
+            <a:r>
+              <a:rPr lang="en-US" dirty="0" smtClean="0"/>
+              <a:t>Choose the threshold and determine the value is abnormal or not</a:t>
+            </a:r>
+          </a:p>
+          <a:p>
+            <a:pPr lvl="1"/>
+            <a:r>
+              <a:rPr lang="en-US" dirty="0" smtClean="0"/>
+              <a:t>Label chip as faulty if abnormal value is detected</a:t>
+            </a:r>
+            <a:endParaRPr lang="en-US" dirty="0"/>
+          </a:p>
           <a:p>
             <a:endParaRPr lang="en-SG" dirty="0"/>
           </a:p>
@@ -4485,6 +4502,113 @@
               <a:rPr lang="en-SG" smtClean="0"/>
               <a:pPr/>
               <a:t>7</a:t>
+            </a:fld>
+            <a:endParaRPr lang="en-SG" dirty="0"/>
+          </a:p>
+        </p:txBody>
+      </p:sp>
+    </p:spTree>
+    <p:extLst>
+      <p:ext uri="{BB962C8B-B14F-4D97-AF65-F5344CB8AC3E}">
+        <p14:creationId xmlns:p14="http://schemas.microsoft.com/office/powerpoint/2010/main" val="2796628514"/>
+      </p:ext>
+    </p:extLst>
+  </p:cSld>
+  <p:clrMapOvr>
+    <a:masterClrMapping/>
+  </p:clrMapOvr>
+  <p:timing>
+    <p:tnLst>
+      <p:par>
+        <p:cTn id="1" dur="indefinite" restart="never" nodeType="tmRoot"/>
+      </p:par>
+    </p:tnLst>
+  </p:timing>
+</p:sld>
+</file>
+
+<file path=ppt/slides/slide8.xml><?xml version="1.0" encoding="utf-8"?>
+<p:sld xmlns:a="http://schemas.openxmlformats.org/drawingml/2006/main" xmlns:r="http://schemas.openxmlformats.org/officeDocument/2006/relationships" xmlns:p="http://schemas.openxmlformats.org/presentationml/2006/main">
+  <p:cSld>
+    <p:spTree>
+      <p:nvGrpSpPr>
+        <p:cNvPr id="1" name=""/>
+        <p:cNvGrpSpPr/>
+        <p:nvPr/>
+      </p:nvGrpSpPr>
+      <p:grpSpPr>
+        <a:xfrm>
+          <a:off x="0" y="0"/>
+          <a:ext cx="0" cy="0"/>
+          <a:chOff x="0" y="0"/>
+          <a:chExt cx="0" cy="0"/>
+        </a:xfrm>
+      </p:grpSpPr>
+      <p:sp>
+        <p:nvSpPr>
+          <p:cNvPr id="2" name="Title 1"/>
+          <p:cNvSpPr>
+            <a:spLocks noGrp="1"/>
+          </p:cNvSpPr>
+          <p:nvPr>
+            <p:ph type="title"/>
+          </p:nvPr>
+        </p:nvSpPr>
+        <p:spPr/>
+        <p:txBody>
+          <a:bodyPr/>
+          <a:lstStyle/>
+          <a:p>
+            <a:r>
+              <a:rPr lang="en-US" dirty="0" smtClean="0"/>
+              <a:t>Any other additional comment</a:t>
+            </a:r>
+            <a:endParaRPr lang="en-SG" dirty="0"/>
+          </a:p>
+        </p:txBody>
+      </p:sp>
+      <p:sp>
+        <p:nvSpPr>
+          <p:cNvPr id="3" name="Text Placeholder 2"/>
+          <p:cNvSpPr>
+            <a:spLocks noGrp="1"/>
+          </p:cNvSpPr>
+          <p:nvPr>
+            <p:ph type="body" sz="quarter" idx="13"/>
+          </p:nvPr>
+        </p:nvSpPr>
+        <p:spPr/>
+        <p:txBody>
+          <a:bodyPr/>
+          <a:lstStyle/>
+          <a:p>
+            <a:endParaRPr lang="en-SG" dirty="0"/>
+          </a:p>
+        </p:txBody>
+      </p:sp>
+      <p:sp>
+        <p:nvSpPr>
+          <p:cNvPr id="4" name="Slide Number Placeholder 3"/>
+          <p:cNvSpPr>
+            <a:spLocks noGrp="1"/>
+          </p:cNvSpPr>
+          <p:nvPr>
+            <p:ph type="sldNum" sz="quarter" idx="4"/>
+          </p:nvPr>
+        </p:nvSpPr>
+        <p:spPr/>
+        <p:txBody>
+          <a:bodyPr/>
+          <a:lstStyle/>
+          <a:p>
+            <a:r>
+              <a:rPr lang="en-SG" smtClean="0"/>
+              <a:t>Page </a:t>
+            </a:r>
+            <a:fld id="{2F63C605-4FC6-46DE-BC90-871762EA3F52}" type="slidenum">
+              <a:rPr lang="en-SG" smtClean="0"/>
+              <a:pPr/>
+              <a:t>8</a:t>
             </a:fld>
             <a:endParaRPr lang="en-SG" dirty="0"/>
           </a:p>

</xml_diff>